<commit_message>
Endlosschleife, If ohne geschweifte Klammern
</commit_message>
<xml_diff>
--- a/Folien/Exkurs_Programmiersprache_C.pptx
+++ b/Folien/Exkurs_Programmiersprache_C.pptx
@@ -5,7 +5,7 @@
     <p:sldMasterId id="2147483648" r:id="rId4"/>
   </p:sldMasterIdLst>
   <p:notesMasterIdLst>
-    <p:notesMasterId r:id="rId27"/>
+    <p:notesMasterId r:id="rId28"/>
   </p:notesMasterIdLst>
   <p:sldIdLst>
     <p:sldId id="291" r:id="rId5"/>
@@ -29,7 +29,8 @@
     <p:sldId id="336" r:id="rId23"/>
     <p:sldId id="316" r:id="rId24"/>
     <p:sldId id="317" r:id="rId25"/>
-    <p:sldId id="315" r:id="rId26"/>
+    <p:sldId id="258" r:id="rId26"/>
+    <p:sldId id="315" r:id="rId27"/>
   </p:sldIdLst>
   <p:sldSz cx="12192000" cy="6858000"/>
   <p:notesSz cx="6858000" cy="9144000"/>
@@ -218,7 +219,7 @@
           <a:p>
             <a:fld id="{1111EAE3-0D17-7D4D-B5C8-7430D3A14508}" type="datetimeFigureOut">
               <a:rPr lang="en-US" smtClean="0"/>
-              <a:t>11/16/22</a:t>
+              <a:t>12/9/22</a:t>
             </a:fld>
             <a:endParaRPr lang="en-US"/>
           </a:p>
@@ -2403,7 +2404,7 @@
           <a:p>
             <a:fld id="{46878720-212C-42BB-B356-99628BFE1EBF}" type="datetimeFigureOut">
               <a:rPr lang="en-US" smtClean="0"/>
-              <a:t>11/16/22</a:t>
+              <a:t>12/9/22</a:t>
             </a:fld>
             <a:endParaRPr lang="en-US"/>
           </a:p>
@@ -2601,7 +2602,7 @@
           <a:p>
             <a:fld id="{46878720-212C-42BB-B356-99628BFE1EBF}" type="datetimeFigureOut">
               <a:rPr lang="en-US" smtClean="0"/>
-              <a:t>11/16/22</a:t>
+              <a:t>12/9/22</a:t>
             </a:fld>
             <a:endParaRPr lang="en-US"/>
           </a:p>
@@ -2809,7 +2810,7 @@
           <a:p>
             <a:fld id="{46878720-212C-42BB-B356-99628BFE1EBF}" type="datetimeFigureOut">
               <a:rPr lang="en-US" smtClean="0"/>
-              <a:t>11/16/22</a:t>
+              <a:t>12/9/22</a:t>
             </a:fld>
             <a:endParaRPr lang="en-US"/>
           </a:p>
@@ -2873,6 +2874,99 @@
     <p:extLst>
       <p:ext uri="{BB962C8B-B14F-4D97-AF65-F5344CB8AC3E}">
         <p14:creationId xmlns:p14="http://schemas.microsoft.com/office/powerpoint/2010/main" val="4293597831"/>
+      </p:ext>
+    </p:extLst>
+  </p:cSld>
+  <p:clrMapOvr>
+    <a:masterClrMapping/>
+  </p:clrMapOvr>
+</p:sldLayout>
+</file>
+
+<file path=ppt/slideLayouts/slideLayout12.xml><?xml version="1.0" encoding="utf-8"?>
+<p:sldLayout xmlns:a="http://schemas.openxmlformats.org/drawingml/2006/main" xmlns:r="http://schemas.openxmlformats.org/officeDocument/2006/relationships" xmlns:p="http://schemas.openxmlformats.org/presentationml/2006/main" type="obj">
+  <p:cSld name="Title, Content">
+    <p:spTree>
+      <p:nvGrpSpPr>
+        <p:cNvPr id="1" name=""/>
+        <p:cNvGrpSpPr/>
+        <p:nvPr/>
+      </p:nvGrpSpPr>
+      <p:grpSpPr>
+        <a:xfrm>
+          <a:off x="0" y="0"/>
+          <a:ext cx="0" cy="0"/>
+          <a:chOff x="0" y="0"/>
+          <a:chExt cx="0" cy="0"/>
+        </a:xfrm>
+      </p:grpSpPr>
+      <p:sp>
+        <p:nvSpPr>
+          <p:cNvPr id="7" name="PlaceHolder 1"/>
+          <p:cNvSpPr>
+            <a:spLocks noGrp="1"/>
+          </p:cNvSpPr>
+          <p:nvPr>
+            <p:ph type="title"/>
+          </p:nvPr>
+        </p:nvSpPr>
+        <p:spPr>
+          <a:xfrm>
+            <a:off x="609562" y="273422"/>
+            <a:ext cx="10971684" cy="1144631"/>
+          </a:xfrm>
+          <a:prstGeom prst="rect">
+            <a:avLst/>
+          </a:prstGeom>
+        </p:spPr>
+        <p:txBody>
+          <a:bodyPr lIns="0" tIns="0" rIns="0" bIns="0" anchor="ctr">
+            <a:noAutofit/>
+          </a:bodyPr>
+          <a:lstStyle/>
+          <a:p>
+            <a:pPr algn="ctr"/>
+            <a:endParaRPr lang="en-US" sz="5321" b="0" strike="noStrike" spc="-1">
+              <a:latin typeface="Arial"/>
+            </a:endParaRPr>
+          </a:p>
+        </p:txBody>
+      </p:sp>
+      <p:sp>
+        <p:nvSpPr>
+          <p:cNvPr id="8" name="PlaceHolder 2"/>
+          <p:cNvSpPr>
+            <a:spLocks noGrp="1"/>
+          </p:cNvSpPr>
+          <p:nvPr>
+            <p:ph type="body"/>
+          </p:nvPr>
+        </p:nvSpPr>
+        <p:spPr>
+          <a:xfrm>
+            <a:off x="609562" y="1604399"/>
+            <a:ext cx="10971684" cy="3976819"/>
+          </a:xfrm>
+          <a:prstGeom prst="rect">
+            <a:avLst/>
+          </a:prstGeom>
+        </p:spPr>
+        <p:txBody>
+          <a:bodyPr lIns="0" tIns="0" rIns="0" bIns="0">
+            <a:normAutofit/>
+          </a:bodyPr>
+          <a:lstStyle/>
+          <a:p>
+            <a:endParaRPr lang="en-US" sz="3870" b="0" strike="noStrike" spc="-1">
+              <a:latin typeface="Arial"/>
+            </a:endParaRPr>
+          </a:p>
+        </p:txBody>
+      </p:sp>
+    </p:spTree>
+    <p:extLst>
+      <p:ext uri="{BB962C8B-B14F-4D97-AF65-F5344CB8AC3E}">
+        <p14:creationId xmlns:p14="http://schemas.microsoft.com/office/powerpoint/2010/main" val="2055709860"/>
       </p:ext>
     </p:extLst>
   </p:cSld>
@@ -3007,7 +3101,7 @@
           <a:p>
             <a:fld id="{46878720-212C-42BB-B356-99628BFE1EBF}" type="datetimeFigureOut">
               <a:rPr lang="en-US" smtClean="0"/>
-              <a:t>11/16/22</a:t>
+              <a:t>12/9/22</a:t>
             </a:fld>
             <a:endParaRPr lang="en-US"/>
           </a:p>
@@ -3282,7 +3376,7 @@
           <a:p>
             <a:fld id="{46878720-212C-42BB-B356-99628BFE1EBF}" type="datetimeFigureOut">
               <a:rPr lang="en-US" smtClean="0"/>
-              <a:t>11/16/22</a:t>
+              <a:t>12/9/22</a:t>
             </a:fld>
             <a:endParaRPr lang="en-US"/>
           </a:p>
@@ -3547,7 +3641,7 @@
           <a:p>
             <a:fld id="{46878720-212C-42BB-B356-99628BFE1EBF}" type="datetimeFigureOut">
               <a:rPr lang="en-US" smtClean="0"/>
-              <a:t>11/16/22</a:t>
+              <a:t>12/9/22</a:t>
             </a:fld>
             <a:endParaRPr lang="en-US"/>
           </a:p>
@@ -3959,7 +4053,7 @@
           <a:p>
             <a:fld id="{46878720-212C-42BB-B356-99628BFE1EBF}" type="datetimeFigureOut">
               <a:rPr lang="en-US" smtClean="0"/>
-              <a:t>11/16/22</a:t>
+              <a:t>12/9/22</a:t>
             </a:fld>
             <a:endParaRPr lang="en-US"/>
           </a:p>
@@ -4100,7 +4194,7 @@
           <a:p>
             <a:fld id="{46878720-212C-42BB-B356-99628BFE1EBF}" type="datetimeFigureOut">
               <a:rPr lang="en-US" smtClean="0"/>
-              <a:t>11/16/22</a:t>
+              <a:t>12/9/22</a:t>
             </a:fld>
             <a:endParaRPr lang="en-US"/>
           </a:p>
@@ -4213,7 +4307,7 @@
           <a:p>
             <a:fld id="{46878720-212C-42BB-B356-99628BFE1EBF}" type="datetimeFigureOut">
               <a:rPr lang="en-US" smtClean="0"/>
-              <a:t>11/16/22</a:t>
+              <a:t>12/9/22</a:t>
             </a:fld>
             <a:endParaRPr lang="en-US"/>
           </a:p>
@@ -4524,7 +4618,7 @@
           <a:p>
             <a:fld id="{46878720-212C-42BB-B356-99628BFE1EBF}" type="datetimeFigureOut">
               <a:rPr lang="en-US" smtClean="0"/>
-              <a:t>11/16/22</a:t>
+              <a:t>12/9/22</a:t>
             </a:fld>
             <a:endParaRPr lang="en-US"/>
           </a:p>
@@ -4812,7 +4906,7 @@
           <a:p>
             <a:fld id="{46878720-212C-42BB-B356-99628BFE1EBF}" type="datetimeFigureOut">
               <a:rPr lang="en-US" smtClean="0"/>
-              <a:t>11/16/22</a:t>
+              <a:t>12/9/22</a:t>
             </a:fld>
             <a:endParaRPr lang="en-US"/>
           </a:p>
@@ -5053,7 +5147,7 @@
           <a:p>
             <a:fld id="{46878720-212C-42BB-B356-99628BFE1EBF}" type="datetimeFigureOut">
               <a:rPr lang="en-US" smtClean="0"/>
-              <a:t>11/16/22</a:t>
+              <a:t>12/9/22</a:t>
             </a:fld>
             <a:endParaRPr lang="en-US"/>
           </a:p>
@@ -5169,6 +5263,7 @@
     <p:sldLayoutId id="2147483657" r:id="rId9"/>
     <p:sldLayoutId id="2147483658" r:id="rId10"/>
     <p:sldLayoutId id="2147483659" r:id="rId11"/>
+    <p:sldLayoutId id="2147483660" r:id="rId12"/>
   </p:sldLayoutIdLst>
   <p:txStyles>
     <p:titleStyle>
@@ -8493,6 +8588,77 @@
           </a:p>
         </p:txBody>
       </p:sp>
+      <p:sp>
+        <p:nvSpPr>
+          <p:cNvPr id="3" name="TextShape 12">
+            <a:extLst>
+              <a:ext uri="{FF2B5EF4-FFF2-40B4-BE49-F238E27FC236}">
+                <a16:creationId xmlns:a16="http://schemas.microsoft.com/office/drawing/2014/main" id="{823CFE95-223E-22D0-94DA-3735CFA0DF1C}"/>
+              </a:ext>
+            </a:extLst>
+          </p:cNvPr>
+          <p:cNvSpPr txBox="1"/>
+          <p:nvPr/>
+        </p:nvSpPr>
+        <p:spPr>
+          <a:xfrm>
+            <a:off x="737711" y="4861307"/>
+            <a:ext cx="3200400" cy="1027800"/>
+          </a:xfrm>
+          <a:prstGeom prst="rect">
+            <a:avLst/>
+          </a:prstGeom>
+          <a:noFill/>
+          <a:ln w="0">
+            <a:noFill/>
+          </a:ln>
+        </p:spPr>
+        <p:txBody>
+          <a:bodyPr lIns="90000" tIns="45000" rIns="90000" bIns="45000">
+            <a:noAutofit/>
+          </a:bodyPr>
+          <a:lstStyle/>
+          <a:p>
+            <a:r>
+              <a:rPr lang="en-US" sz="2200" b="1" strike="noStrike" spc="-1" dirty="0" err="1">
+                <a:highlight>
+                  <a:srgbClr val="FFFF00"/>
+                </a:highlight>
+                <a:latin typeface="Arial"/>
+              </a:rPr>
+              <a:t>Unendlichkeit</a:t>
+            </a:r>
+            <a:endParaRPr lang="en-US" sz="2200" b="0" strike="noStrike" spc="-1" dirty="0">
+              <a:highlight>
+                <a:srgbClr val="FFFF00"/>
+              </a:highlight>
+              <a:latin typeface="Arial"/>
+            </a:endParaRPr>
+          </a:p>
+          <a:p>
+            <a:r>
+              <a:rPr lang="en-US" sz="2200" b="0" strike="noStrike" spc="-1" dirty="0">
+                <a:highlight>
+                  <a:srgbClr val="FFFF00"/>
+                </a:highlight>
+                <a:latin typeface="Arial"/>
+              </a:rPr>
+              <a:t>for(; ;) {</a:t>
+            </a:r>
+          </a:p>
+          <a:p>
+            <a:r>
+              <a:rPr lang="en-US" sz="2200" b="0" strike="noStrike" spc="-1" dirty="0">
+                <a:highlight>
+                  <a:srgbClr val="FFFF00"/>
+                </a:highlight>
+                <a:latin typeface="Arial"/>
+              </a:rPr>
+              <a:t>}</a:t>
+            </a:r>
+          </a:p>
+        </p:txBody>
+      </p:sp>
     </p:spTree>
     <p:extLst>
       <p:ext uri="{BB962C8B-B14F-4D97-AF65-F5344CB8AC3E}">
@@ -8964,6 +9130,281 @@
 </file>
 
 <file path=ppt/slides/slide22.xml><?xml version="1.0" encoding="utf-8"?>
+<p:sld xmlns:a="http://schemas.openxmlformats.org/drawingml/2006/main" xmlns:r="http://schemas.openxmlformats.org/officeDocument/2006/relationships" xmlns:p="http://schemas.openxmlformats.org/presentationml/2006/main">
+  <p:cSld>
+    <p:spTree>
+      <p:nvGrpSpPr>
+        <p:cNvPr id="1" name=""/>
+        <p:cNvGrpSpPr/>
+        <p:nvPr/>
+      </p:nvGrpSpPr>
+      <p:grpSpPr>
+        <a:xfrm>
+          <a:off x="0" y="0"/>
+          <a:ext cx="0" cy="0"/>
+          <a:chOff x="0" y="0"/>
+          <a:chExt cx="0" cy="0"/>
+        </a:xfrm>
+      </p:grpSpPr>
+      <p:sp>
+        <p:nvSpPr>
+          <p:cNvPr id="104" name="TextShape 1"/>
+          <p:cNvSpPr txBox="1"/>
+          <p:nvPr/>
+        </p:nvSpPr>
+        <p:spPr>
+          <a:xfrm>
+            <a:off x="609755" y="273422"/>
+            <a:ext cx="10971300" cy="1144631"/>
+          </a:xfrm>
+          <a:prstGeom prst="rect">
+            <a:avLst/>
+          </a:prstGeom>
+          <a:noFill/>
+          <a:ln w="0">
+            <a:noFill/>
+          </a:ln>
+        </p:spPr>
+        <p:txBody>
+          <a:bodyPr lIns="0" tIns="0" rIns="0" bIns="0" anchor="ctr">
+            <a:noAutofit/>
+          </a:bodyPr>
+          <a:lstStyle/>
+          <a:p>
+            <a:pPr algn="ctr"/>
+            <a:endParaRPr lang="en-US" sz="5321" spc="-1">
+              <a:latin typeface="Arial"/>
+            </a:endParaRPr>
+          </a:p>
+        </p:txBody>
+      </p:sp>
+      <p:sp>
+        <p:nvSpPr>
+          <p:cNvPr id="105" name="TextShape 2"/>
+          <p:cNvSpPr txBox="1"/>
+          <p:nvPr/>
+        </p:nvSpPr>
+        <p:spPr>
+          <a:xfrm>
+            <a:off x="609755" y="1604399"/>
+            <a:ext cx="10971300" cy="3976819"/>
+          </a:xfrm>
+          <a:prstGeom prst="rect">
+            <a:avLst/>
+          </a:prstGeom>
+          <a:noFill/>
+          <a:ln w="0">
+            <a:noFill/>
+          </a:ln>
+        </p:spPr>
+        <p:txBody>
+          <a:bodyPr lIns="0" tIns="0" rIns="0" bIns="0">
+            <a:normAutofit fontScale="81000" lnSpcReduction="20000"/>
+          </a:bodyPr>
+          <a:lstStyle/>
+          <a:p>
+            <a:pPr marL="130615">
+              <a:spcBef>
+                <a:spcPts val="1714"/>
+              </a:spcBef>
+              <a:buClr>
+                <a:srgbClr val="000000"/>
+              </a:buClr>
+              <a:buSzPct val="45000"/>
+            </a:pPr>
+            <a:r>
+              <a:rPr lang="en-US" sz="3870" spc="-1" dirty="0">
+                <a:latin typeface="Arial"/>
+              </a:rPr>
+              <a:t>if (</a:t>
+            </a:r>
+            <a:r>
+              <a:rPr lang="en-US" sz="3870" spc="-1" dirty="0" err="1">
+                <a:latin typeface="Arial"/>
+              </a:rPr>
+              <a:t>serialEventRun</a:t>
+            </a:r>
+            <a:r>
+              <a:rPr lang="en-US" sz="3870" spc="-1" dirty="0">
+                <a:latin typeface="Arial"/>
+              </a:rPr>
+              <a:t>) </a:t>
+            </a:r>
+            <a:r>
+              <a:rPr lang="en-US" sz="3870" spc="-1" dirty="0" err="1">
+                <a:latin typeface="Arial"/>
+              </a:rPr>
+              <a:t>serialEventRun</a:t>
+            </a:r>
+            <a:r>
+              <a:rPr lang="en-US" sz="3870" spc="-1" dirty="0">
+                <a:latin typeface="Arial"/>
+              </a:rPr>
+              <a:t>();</a:t>
+            </a:r>
+          </a:p>
+          <a:p>
+            <a:pPr marL="522461" indent="-391846">
+              <a:spcBef>
+                <a:spcPts val="1714"/>
+              </a:spcBef>
+              <a:buClr>
+                <a:srgbClr val="000000"/>
+              </a:buClr>
+              <a:buSzPct val="45000"/>
+              <a:buFont typeface="Wingdings" charset="2"/>
+              <a:buChar char=""/>
+            </a:pPr>
+            <a:endParaRPr lang="en-US" sz="3870" spc="-1" dirty="0">
+              <a:latin typeface="Arial"/>
+            </a:endParaRPr>
+          </a:p>
+          <a:p>
+            <a:pPr marL="130615">
+              <a:spcBef>
+                <a:spcPts val="1714"/>
+              </a:spcBef>
+              <a:buClr>
+                <a:srgbClr val="000000"/>
+              </a:buClr>
+              <a:buSzPct val="45000"/>
+            </a:pPr>
+            <a:r>
+              <a:rPr lang="en-US" sz="3870" spc="-1" dirty="0" err="1">
+                <a:latin typeface="Arial"/>
+              </a:rPr>
+              <a:t>Ist</a:t>
+            </a:r>
+            <a:r>
+              <a:rPr lang="en-US" sz="3870" spc="-1" dirty="0">
+                <a:latin typeface="Arial"/>
+              </a:rPr>
+              <a:t> </a:t>
+            </a:r>
+            <a:r>
+              <a:rPr lang="en-US" sz="3870" spc="-1" dirty="0" err="1">
+                <a:latin typeface="Arial"/>
+              </a:rPr>
+              <a:t>dasselbe</a:t>
+            </a:r>
+            <a:r>
+              <a:rPr lang="en-US" sz="3870" spc="-1" dirty="0">
+                <a:latin typeface="Arial"/>
+              </a:rPr>
+              <a:t> </a:t>
+            </a:r>
+            <a:r>
+              <a:rPr lang="en-US" sz="3870" spc="-1" dirty="0" err="1">
+                <a:latin typeface="Arial"/>
+              </a:rPr>
+              <a:t>wie</a:t>
+            </a:r>
+            <a:endParaRPr lang="en-US" sz="3870" spc="-1" dirty="0">
+              <a:latin typeface="Arial"/>
+            </a:endParaRPr>
+          </a:p>
+          <a:p>
+            <a:pPr marL="522461" indent="-391846">
+              <a:spcBef>
+                <a:spcPts val="1714"/>
+              </a:spcBef>
+              <a:buClr>
+                <a:srgbClr val="000000"/>
+              </a:buClr>
+              <a:buSzPct val="45000"/>
+              <a:buFont typeface="Wingdings" charset="2"/>
+              <a:buChar char=""/>
+            </a:pPr>
+            <a:endParaRPr lang="en-US" sz="3870" spc="-1" dirty="0">
+              <a:latin typeface="Arial"/>
+            </a:endParaRPr>
+          </a:p>
+          <a:p>
+            <a:pPr marL="130615">
+              <a:spcBef>
+                <a:spcPts val="1714"/>
+              </a:spcBef>
+              <a:buClr>
+                <a:srgbClr val="000000"/>
+              </a:buClr>
+              <a:buSzPct val="45000"/>
+            </a:pPr>
+            <a:r>
+              <a:rPr lang="en-US" sz="3870" spc="-1" dirty="0">
+                <a:latin typeface="Arial"/>
+              </a:rPr>
+              <a:t>if (</a:t>
+            </a:r>
+            <a:r>
+              <a:rPr lang="en-US" sz="3870" spc="-1" dirty="0" err="1">
+                <a:latin typeface="Arial"/>
+              </a:rPr>
+              <a:t>serialEventRun</a:t>
+            </a:r>
+            <a:r>
+              <a:rPr lang="en-US" sz="3870" spc="-1" dirty="0">
+                <a:latin typeface="Arial"/>
+              </a:rPr>
+              <a:t>) {</a:t>
+            </a:r>
+          </a:p>
+          <a:p>
+            <a:pPr marL="130615">
+              <a:spcBef>
+                <a:spcPts val="1714"/>
+              </a:spcBef>
+              <a:buClr>
+                <a:srgbClr val="000000"/>
+              </a:buClr>
+              <a:buSzPct val="45000"/>
+            </a:pPr>
+            <a:r>
+              <a:rPr lang="en-US" sz="3870" spc="-1" dirty="0">
+                <a:latin typeface="Arial"/>
+              </a:rPr>
+              <a:t>    </a:t>
+            </a:r>
+            <a:r>
+              <a:rPr lang="en-US" sz="3870" spc="-1" dirty="0" err="1">
+                <a:latin typeface="Arial"/>
+              </a:rPr>
+              <a:t>serialEventRun</a:t>
+            </a:r>
+            <a:r>
+              <a:rPr lang="en-US" sz="3870" spc="-1" dirty="0">
+                <a:latin typeface="Arial"/>
+              </a:rPr>
+              <a:t>();</a:t>
+            </a:r>
+          </a:p>
+          <a:p>
+            <a:pPr marL="130615">
+              <a:spcBef>
+                <a:spcPts val="1714"/>
+              </a:spcBef>
+              <a:buClr>
+                <a:srgbClr val="000000"/>
+              </a:buClr>
+              <a:buSzPct val="45000"/>
+            </a:pPr>
+            <a:r>
+              <a:rPr lang="en-US" sz="3870" spc="-1" dirty="0">
+                <a:latin typeface="Arial"/>
+              </a:rPr>
+              <a:t>}</a:t>
+            </a:r>
+          </a:p>
+        </p:txBody>
+      </p:sp>
+    </p:spTree>
+  </p:cSld>
+  <p:clrMapOvr>
+    <a:masterClrMapping/>
+  </p:clrMapOvr>
+</p:sld>
+</file>
+
+<file path=ppt/slides/slide23.xml><?xml version="1.0" encoding="utf-8"?>
 <p:sld xmlns:a="http://schemas.openxmlformats.org/drawingml/2006/main" xmlns:r="http://schemas.openxmlformats.org/officeDocument/2006/relationships" xmlns:p="http://schemas.openxmlformats.org/presentationml/2006/main">
   <p:cSld>
     <p:spTree>
@@ -12973,9 +13414,12 @@
 </file>
 
 <file path=customXml/item1.xml><?xml version="1.0" encoding="utf-8"?>
-<p:properties xmlns:p="http://schemas.microsoft.com/office/2006/metadata/properties" xmlns:xsi="http://www.w3.org/2001/XMLSchema-instance" xmlns:pc="http://schemas.microsoft.com/office/infopath/2007/PartnerControls">
-  <documentManagement/>
-</p:properties>
+<?mso-contentType ?>
+<FormTemplates xmlns="http://schemas.microsoft.com/sharepoint/v3/contenttype/forms">
+  <Display>DocumentLibraryForm</Display>
+  <Edit>DocumentLibraryForm</Edit>
+  <New>DocumentLibraryForm</New>
+</FormTemplates>
 </file>
 
 <file path=customXml/item2.xml><?xml version="1.0" encoding="utf-8"?>
@@ -13196,27 +13640,15 @@
 </file>
 
 <file path=customXml/item3.xml><?xml version="1.0" encoding="utf-8"?>
-<?mso-contentType ?>
-<FormTemplates xmlns="http://schemas.microsoft.com/sharepoint/v3/contenttype/forms">
-  <Display>DocumentLibraryForm</Display>
-  <Edit>DocumentLibraryForm</Edit>
-  <New>DocumentLibraryForm</New>
-</FormTemplates>
+<p:properties xmlns:p="http://schemas.microsoft.com/office/2006/metadata/properties" xmlns:xsi="http://www.w3.org/2001/XMLSchema-instance" xmlns:pc="http://schemas.microsoft.com/office/infopath/2007/PartnerControls">
+  <documentManagement/>
+</p:properties>
 </file>
 
 <file path=customXml/itemProps1.xml><?xml version="1.0" encoding="utf-8"?>
-<ds:datastoreItem xmlns:ds="http://schemas.openxmlformats.org/officeDocument/2006/customXml" ds:itemID="{68B22CCF-3790-4DAF-9B94-BBE8105DACDB}">
+<ds:datastoreItem xmlns:ds="http://schemas.openxmlformats.org/officeDocument/2006/customXml" ds:itemID="{19285E5B-5F99-40AB-B4B4-B67FE3E29063}">
   <ds:schemaRefs>
-    <ds:schemaRef ds:uri="http://purl.org/dc/elements/1.1/"/>
-    <ds:schemaRef ds:uri="http://schemas.openxmlformats.org/package/2006/metadata/core-properties"/>
-    <ds:schemaRef ds:uri="http://schemas.microsoft.com/office/2006/documentManagement/types"/>
-    <ds:schemaRef ds:uri="7e0397fa-c04e-494e-b1f1-774ad14ae133"/>
-    <ds:schemaRef ds:uri="http://www.w3.org/XML/1998/namespace"/>
-    <ds:schemaRef ds:uri="http://schemas.microsoft.com/office/infopath/2007/PartnerControls"/>
-    <ds:schemaRef ds:uri="http://purl.org/dc/dcmitype/"/>
-    <ds:schemaRef ds:uri="8413540a-1bb6-4053-94a1-f89835fea1c0"/>
-    <ds:schemaRef ds:uri="http://schemas.microsoft.com/office/2006/metadata/properties"/>
-    <ds:schemaRef ds:uri="http://purl.org/dc/terms/"/>
+    <ds:schemaRef ds:uri="http://schemas.microsoft.com/sharepoint/v3/contenttype/forms"/>
   </ds:schemaRefs>
 </ds:datastoreItem>
 </file>
@@ -13241,9 +13673,18 @@
 </file>
 
 <file path=customXml/itemProps3.xml><?xml version="1.0" encoding="utf-8"?>
-<ds:datastoreItem xmlns:ds="http://schemas.openxmlformats.org/officeDocument/2006/customXml" ds:itemID="{19285E5B-5F99-40AB-B4B4-B67FE3E29063}">
+<ds:datastoreItem xmlns:ds="http://schemas.openxmlformats.org/officeDocument/2006/customXml" ds:itemID="{68B22CCF-3790-4DAF-9B94-BBE8105DACDB}">
   <ds:schemaRefs>
-    <ds:schemaRef ds:uri="http://schemas.microsoft.com/sharepoint/v3/contenttype/forms"/>
+    <ds:schemaRef ds:uri="http://purl.org/dc/elements/1.1/"/>
+    <ds:schemaRef ds:uri="http://schemas.openxmlformats.org/package/2006/metadata/core-properties"/>
+    <ds:schemaRef ds:uri="http://schemas.microsoft.com/office/2006/documentManagement/types"/>
+    <ds:schemaRef ds:uri="7e0397fa-c04e-494e-b1f1-774ad14ae133"/>
+    <ds:schemaRef ds:uri="http://www.w3.org/XML/1998/namespace"/>
+    <ds:schemaRef ds:uri="http://schemas.microsoft.com/office/infopath/2007/PartnerControls"/>
+    <ds:schemaRef ds:uri="http://purl.org/dc/dcmitype/"/>
+    <ds:schemaRef ds:uri="8413540a-1bb6-4053-94a1-f89835fea1c0"/>
+    <ds:schemaRef ds:uri="http://schemas.microsoft.com/office/2006/metadata/properties"/>
+    <ds:schemaRef ds:uri="http://purl.org/dc/terms/"/>
   </ds:schemaRefs>
 </ds:datastoreItem>
 </file>
</xml_diff>